<commit_message>
LOC of the day
</commit_message>
<xml_diff>
--- a/OOP SEMESTER PROJECT/E-voting System.pptx
+++ b/OOP SEMESTER PROJECT/E-voting System.pptx
@@ -1053,17 +1053,17 @@
       </dgm:t>
     </dgm:pt>
     <dgm:pt modelId="{228A3FD5-C2C7-4537-BCF3-1C906A620408}">
-      <dgm:prSet/>
+      <dgm:prSet custT="1"/>
       <dgm:spPr/>
       <dgm:t>
         <a:bodyPr/>
         <a:lstStyle/>
         <a:p>
           <a:r>
-            <a:rPr lang="en-US" baseline="0"/>
-            <a:t>An E.voting system that portrays the different principles of Object-Oriented Programming that is to say abstraction, encapsulation, inheritance and polymorphism.</a:t>
+            <a:rPr lang="en-US" sz="1400" baseline="0" dirty="0"/>
+            <a:t>An E-voting system that portrays the different principles of Object-Oriented Programming that is to say abstraction, encapsulation, inheritance and polymorphism.</a:t>
           </a:r>
-          <a:endParaRPr lang="en-US"/>
+          <a:endParaRPr lang="en-US" sz="1400" dirty="0"/>
         </a:p>
       </dgm:t>
     </dgm:pt>
@@ -1097,10 +1097,10 @@
         <a:lstStyle/>
         <a:p>
           <a:r>
-            <a:rPr lang="en-US" baseline="0"/>
-            <a:t>We zeroed down to Mukono as the voting location where one has to be a resident of the area and 18 years and above inorder to vote.</a:t>
+            <a:rPr lang="en-US" baseline="0" dirty="0"/>
+            <a:t>We zeroed down to Mukono as the voting location where one has to be a resident of the area and 18 years and above in order to vote.</a:t>
           </a:r>
-          <a:endParaRPr lang="en-US"/>
+          <a:endParaRPr lang="en-US" dirty="0"/>
         </a:p>
       </dgm:t>
     </dgm:pt>
@@ -1457,7 +1457,7 @@
       </dsp:nvSpPr>
       <dsp:spPr>
         <a:xfrm>
-          <a:off x="815367" y="988951"/>
+          <a:off x="815367" y="591876"/>
           <a:ext cx="810000" cy="810000"/>
         </a:xfrm>
         <a:prstGeom prst="rect">
@@ -1506,8 +1506,8 @@
       </dsp:nvSpPr>
       <dsp:spPr>
         <a:xfrm>
-          <a:off x="320367" y="2132526"/>
-          <a:ext cx="1800000" cy="1080000"/>
+          <a:off x="320367" y="1854601"/>
+          <a:ext cx="1800000" cy="1755000"/>
         </a:xfrm>
         <a:prstGeom prst="rect">
           <a:avLst/>
@@ -1536,7 +1536,7 @@
         </a:bodyPr>
         <a:lstStyle/>
         <a:p>
-          <a:pPr marL="0" lvl="0" indent="0" algn="ctr" defTabSz="488950">
+          <a:pPr marL="0" lvl="0" indent="0" algn="ctr" defTabSz="622300">
             <a:lnSpc>
               <a:spcPct val="90000"/>
             </a:lnSpc>
@@ -1549,15 +1549,15 @@
             <a:buNone/>
           </a:pPr>
           <a:r>
-            <a:rPr lang="en-US" sz="1100" kern="1200" baseline="0"/>
-            <a:t>An E.voting system that portrays the different principles of Object-Oriented Programming that is to say abstraction, encapsulation, inheritance and polymorphism.</a:t>
+            <a:rPr lang="en-US" sz="1400" kern="1200" baseline="0" dirty="0"/>
+            <a:t>An E-voting system that portrays the different principles of Object-Oriented Programming that is to say abstraction, encapsulation, inheritance and polymorphism.</a:t>
           </a:r>
-          <a:endParaRPr lang="en-US" sz="1100" kern="1200"/>
+          <a:endParaRPr lang="en-US" sz="1400" kern="1200" dirty="0"/>
         </a:p>
       </dsp:txBody>
       <dsp:txXfrm>
-        <a:off x="320367" y="2132526"/>
-        <a:ext cx="1800000" cy="1080000"/>
+        <a:off x="320367" y="1854601"/>
+        <a:ext cx="1800000" cy="1755000"/>
       </dsp:txXfrm>
     </dsp:sp>
     <dsp:sp modelId="{E7141B76-D61D-4B8E-B08F-BFB1982D7B9E}">
@@ -1567,7 +1567,7 @@
       </dsp:nvSpPr>
       <dsp:spPr>
         <a:xfrm>
-          <a:off x="2930367" y="988951"/>
+          <a:off x="2930367" y="591876"/>
           <a:ext cx="810000" cy="810000"/>
         </a:xfrm>
         <a:prstGeom prst="rect">
@@ -1616,8 +1616,8 @@
       </dsp:nvSpPr>
       <dsp:spPr>
         <a:xfrm>
-          <a:off x="2435367" y="2132526"/>
-          <a:ext cx="1800000" cy="1080000"/>
+          <a:off x="2435367" y="1854601"/>
+          <a:ext cx="1800000" cy="1755000"/>
         </a:xfrm>
         <a:prstGeom prst="rect">
           <a:avLst/>
@@ -1646,7 +1646,7 @@
         </a:bodyPr>
         <a:lstStyle/>
         <a:p>
-          <a:pPr marL="0" lvl="0" indent="0" algn="ctr" defTabSz="488950">
+          <a:pPr marL="0" lvl="0" indent="0" algn="ctr" defTabSz="622300">
             <a:lnSpc>
               <a:spcPct val="90000"/>
             </a:lnSpc>
@@ -1659,15 +1659,15 @@
             <a:buNone/>
           </a:pPr>
           <a:r>
-            <a:rPr lang="en-US" sz="1100" kern="1200" baseline="0"/>
-            <a:t>We zeroed down to Mukono as the voting location where one has to be a resident of the area and 18 years and above inorder to vote.</a:t>
+            <a:rPr lang="en-US" sz="1400" kern="1200" baseline="0" dirty="0"/>
+            <a:t>We zeroed down to Mukono as the voting location where one has to be a resident of the area and 18 years and above in order to vote.</a:t>
           </a:r>
-          <a:endParaRPr lang="en-US" sz="1100" kern="1200"/>
+          <a:endParaRPr lang="en-US" sz="1400" kern="1200" dirty="0"/>
         </a:p>
       </dsp:txBody>
       <dsp:txXfrm>
-        <a:off x="2435367" y="2132526"/>
-        <a:ext cx="1800000" cy="1080000"/>
+        <a:off x="2435367" y="1854601"/>
+        <a:ext cx="1800000" cy="1755000"/>
       </dsp:txXfrm>
     </dsp:sp>
     <dsp:sp modelId="{922B8494-BF92-4B77-BA68-CB3037C69136}">
@@ -1677,7 +1677,7 @@
       </dsp:nvSpPr>
       <dsp:spPr>
         <a:xfrm>
-          <a:off x="5045367" y="988951"/>
+          <a:off x="5045367" y="591876"/>
           <a:ext cx="810000" cy="810000"/>
         </a:xfrm>
         <a:prstGeom prst="rect">
@@ -1726,8 +1726,8 @@
       </dsp:nvSpPr>
       <dsp:spPr>
         <a:xfrm>
-          <a:off x="4550367" y="2132526"/>
-          <a:ext cx="1800000" cy="1080000"/>
+          <a:off x="4550367" y="1854601"/>
+          <a:ext cx="1800000" cy="1755000"/>
         </a:xfrm>
         <a:prstGeom prst="rect">
           <a:avLst/>
@@ -1756,7 +1756,7 @@
         </a:bodyPr>
         <a:lstStyle/>
         <a:p>
-          <a:pPr marL="0" lvl="0" indent="0" algn="ctr" defTabSz="488950">
+          <a:pPr marL="0" lvl="0" indent="0" algn="ctr" defTabSz="622300">
             <a:lnSpc>
               <a:spcPct val="90000"/>
             </a:lnSpc>
@@ -1769,15 +1769,15 @@
             <a:buNone/>
           </a:pPr>
           <a:r>
-            <a:rPr lang="en-US" sz="1100" kern="1200" baseline="0"/>
+            <a:rPr lang="en-US" sz="1400" kern="1200" baseline="0"/>
             <a:t>The election is a mayoral election with two candidates who must be between the ages of 25 to 70 years and a resident of Mukono inorder to qualify for candidacy.</a:t>
           </a:r>
-          <a:endParaRPr lang="en-US" sz="1100" kern="1200"/>
+          <a:endParaRPr lang="en-US" sz="1400" kern="1200"/>
         </a:p>
       </dsp:txBody>
       <dsp:txXfrm>
-        <a:off x="4550367" y="2132526"/>
-        <a:ext cx="1800000" cy="1080000"/>
+        <a:off x="4550367" y="1854601"/>
+        <a:ext cx="1800000" cy="1755000"/>
       </dsp:txXfrm>
     </dsp:sp>
     <dsp:sp modelId="{D183346A-9731-4278-BECB-03AB3FA70359}">
@@ -1787,7 +1787,7 @@
       </dsp:nvSpPr>
       <dsp:spPr>
         <a:xfrm>
-          <a:off x="7160367" y="988951"/>
+          <a:off x="7160367" y="591876"/>
           <a:ext cx="810000" cy="810000"/>
         </a:xfrm>
         <a:prstGeom prst="rect">
@@ -1836,8 +1836,8 @@
       </dsp:nvSpPr>
       <dsp:spPr>
         <a:xfrm>
-          <a:off x="6665367" y="2132526"/>
-          <a:ext cx="1800000" cy="1080000"/>
+          <a:off x="6665367" y="1854601"/>
+          <a:ext cx="1800000" cy="1755000"/>
         </a:xfrm>
         <a:prstGeom prst="rect">
           <a:avLst/>
@@ -1866,7 +1866,7 @@
         </a:bodyPr>
         <a:lstStyle/>
         <a:p>
-          <a:pPr marL="0" lvl="0" indent="0" algn="ctr" defTabSz="488950">
+          <a:pPr marL="0" lvl="0" indent="0" algn="ctr" defTabSz="622300">
             <a:lnSpc>
               <a:spcPct val="90000"/>
             </a:lnSpc>
@@ -1879,15 +1879,15 @@
             <a:buNone/>
           </a:pPr>
           <a:r>
-            <a:rPr lang="en-US" sz="1100" kern="1200" baseline="0"/>
+            <a:rPr lang="en-US" sz="1400" kern="1200" baseline="0"/>
             <a:t>When someone votes for a candidate, the system automatically adds to his votes and displays the winner at the end.</a:t>
           </a:r>
-          <a:endParaRPr lang="en-US" sz="1100" kern="1200"/>
+          <a:endParaRPr lang="en-US" sz="1400" kern="1200"/>
         </a:p>
       </dsp:txBody>
       <dsp:txXfrm>
-        <a:off x="6665367" y="2132526"/>
-        <a:ext cx="1800000" cy="1080000"/>
+        <a:off x="6665367" y="1854601"/>
+        <a:ext cx="1800000" cy="1755000"/>
       </dsp:txXfrm>
     </dsp:sp>
   </dsp:spTree>
@@ -3286,7 +3286,7 @@
           <a:p>
             <a:fld id="{E6171E64-FE02-4DE5-B72F-53C3706641C3}" type="datetimeFigureOut">
               <a:rPr lang="en-US" smtClean="0"/>
-              <a:t>11/12/2024</a:t>
+              <a:t>11/14/2024</a:t>
             </a:fld>
             <a:endParaRPr lang="en-US"/>
           </a:p>
@@ -3514,7 +3514,7 @@
           <a:p>
             <a:fld id="{E6171E64-FE02-4DE5-B72F-53C3706641C3}" type="datetimeFigureOut">
               <a:rPr lang="en-US" smtClean="0"/>
-              <a:t>11/12/2024</a:t>
+              <a:t>11/14/2024</a:t>
             </a:fld>
             <a:endParaRPr lang="en-US"/>
           </a:p>
@@ -3694,7 +3694,7 @@
           <a:p>
             <a:fld id="{E6171E64-FE02-4DE5-B72F-53C3706641C3}" type="datetimeFigureOut">
               <a:rPr lang="en-US" smtClean="0"/>
-              <a:t>11/12/2024</a:t>
+              <a:t>11/14/2024</a:t>
             </a:fld>
             <a:endParaRPr lang="en-US"/>
           </a:p>
@@ -3864,7 +3864,7 @@
           <a:p>
             <a:fld id="{E6171E64-FE02-4DE5-B72F-53C3706641C3}" type="datetimeFigureOut">
               <a:rPr lang="en-US" smtClean="0"/>
-              <a:t>11/12/2024</a:t>
+              <a:t>11/14/2024</a:t>
             </a:fld>
             <a:endParaRPr lang="en-US"/>
           </a:p>
@@ -4118,7 +4118,7 @@
           <a:p>
             <a:fld id="{E6171E64-FE02-4DE5-B72F-53C3706641C3}" type="datetimeFigureOut">
               <a:rPr lang="en-US" smtClean="0"/>
-              <a:t>11/12/2024</a:t>
+              <a:t>11/14/2024</a:t>
             </a:fld>
             <a:endParaRPr lang="en-US"/>
           </a:p>
@@ -4444,7 +4444,7 @@
           <a:p>
             <a:fld id="{E6171E64-FE02-4DE5-B72F-53C3706641C3}" type="datetimeFigureOut">
               <a:rPr lang="en-US" smtClean="0"/>
-              <a:t>11/12/2024</a:t>
+              <a:t>11/14/2024</a:t>
             </a:fld>
             <a:endParaRPr lang="en-US"/>
           </a:p>
@@ -4895,7 +4895,7 @@
           <a:p>
             <a:fld id="{E6171E64-FE02-4DE5-B72F-53C3706641C3}" type="datetimeFigureOut">
               <a:rPr lang="en-US" smtClean="0"/>
-              <a:t>11/12/2024</a:t>
+              <a:t>11/14/2024</a:t>
             </a:fld>
             <a:endParaRPr lang="en-US"/>
           </a:p>
@@ -5013,7 +5013,7 @@
           <a:p>
             <a:fld id="{E6171E64-FE02-4DE5-B72F-53C3706641C3}" type="datetimeFigureOut">
               <a:rPr lang="en-US" smtClean="0"/>
-              <a:t>11/12/2024</a:t>
+              <a:t>11/14/2024</a:t>
             </a:fld>
             <a:endParaRPr lang="en-US"/>
           </a:p>
@@ -5108,7 +5108,7 @@
           <a:p>
             <a:fld id="{E6171E64-FE02-4DE5-B72F-53C3706641C3}" type="datetimeFigureOut">
               <a:rPr lang="en-US" smtClean="0"/>
-              <a:t>11/12/2024</a:t>
+              <a:t>11/14/2024</a:t>
             </a:fld>
             <a:endParaRPr lang="en-US"/>
           </a:p>
@@ -5395,7 +5395,7 @@
           <a:p>
             <a:fld id="{E6171E64-FE02-4DE5-B72F-53C3706641C3}" type="datetimeFigureOut">
               <a:rPr lang="en-US" smtClean="0"/>
-              <a:t>11/12/2024</a:t>
+              <a:t>11/14/2024</a:t>
             </a:fld>
             <a:endParaRPr lang="en-US"/>
           </a:p>
@@ -5717,7 +5717,7 @@
           <a:p>
             <a:fld id="{E6171E64-FE02-4DE5-B72F-53C3706641C3}" type="datetimeFigureOut">
               <a:rPr lang="en-US" smtClean="0"/>
-              <a:t>11/12/2024</a:t>
+              <a:t>11/14/2024</a:t>
             </a:fld>
             <a:endParaRPr lang="en-US"/>
           </a:p>
@@ -5971,7 +5971,7 @@
           <a:p>
             <a:fld id="{E6171E64-FE02-4DE5-B72F-53C3706641C3}" type="datetimeFigureOut">
               <a:rPr lang="en-US" smtClean="0"/>
-              <a:t>11/12/2024</a:t>
+              <a:t>11/14/2024</a:t>
             </a:fld>
             <a:endParaRPr lang="en-US"/>
           </a:p>
@@ -6610,8 +6610,8 @@
         </p:nvSpPr>
         <p:spPr>
           <a:xfrm>
-            <a:off x="5522600" y="758952"/>
-            <a:ext cx="5157591" cy="4041648"/>
+            <a:off x="5518039" y="478971"/>
+            <a:ext cx="5157591" cy="2525486"/>
           </a:xfrm>
         </p:spPr>
         <p:txBody>
@@ -6621,14 +6621,14 @@
           <a:lstStyle/>
           <a:p>
             <a:r>
-              <a:rPr lang="en-US">
+              <a:rPr lang="en-US" dirty="0">
                 <a:solidFill>
                   <a:srgbClr val="FFFFFF"/>
                 </a:solidFill>
               </a:rPr>
               <a:t>E.VOTING SYSTEM</a:t>
             </a:r>
-            <a:endParaRPr lang="en-UG">
+            <a:endParaRPr lang="en-UG" dirty="0">
               <a:solidFill>
                 <a:srgbClr val="FFFFFF"/>
               </a:solidFill>
@@ -6654,18 +6654,18 @@
         </p:nvSpPr>
         <p:spPr>
           <a:xfrm>
-            <a:off x="5522600" y="4800600"/>
+            <a:off x="5524536" y="3341915"/>
             <a:ext cx="5157592" cy="1691640"/>
           </a:xfrm>
         </p:spPr>
         <p:txBody>
           <a:bodyPr>
-            <a:normAutofit/>
+            <a:noAutofit/>
           </a:bodyPr>
           <a:lstStyle/>
           <a:p>
             <a:r>
-              <a:rPr lang="en-US" sz="600" dirty="0">
+              <a:rPr lang="en-US" sz="1400" dirty="0">
                 <a:solidFill>
                   <a:srgbClr val="D9D9D9"/>
                 </a:solidFill>
@@ -6675,7 +6675,7 @@
           </a:p>
           <a:p>
             <a:r>
-              <a:rPr lang="en-US" sz="600" dirty="0">
+              <a:rPr lang="en-US" sz="1400" dirty="0">
                 <a:solidFill>
                   <a:srgbClr val="D9D9D9"/>
                 </a:solidFill>
@@ -6685,7 +6685,7 @@
           </a:p>
           <a:p>
             <a:r>
-              <a:rPr lang="en-US" sz="600" dirty="0">
+              <a:rPr lang="en-US" sz="1400" dirty="0">
                 <a:solidFill>
                   <a:srgbClr val="D9D9D9"/>
                 </a:solidFill>
@@ -6695,7 +6695,7 @@
           </a:p>
           <a:p>
             <a:r>
-              <a:rPr lang="en-US" sz="600" dirty="0">
+              <a:rPr lang="en-US" sz="1400" dirty="0">
                 <a:solidFill>
                   <a:srgbClr val="D9D9D9"/>
                 </a:solidFill>
@@ -6705,7 +6705,7 @@
           </a:p>
           <a:p>
             <a:r>
-              <a:rPr lang="en-US" sz="600" dirty="0">
+              <a:rPr lang="en-US" sz="1400" dirty="0">
                 <a:solidFill>
                   <a:srgbClr val="D9D9D9"/>
                 </a:solidFill>
@@ -6715,14 +6715,14 @@
           </a:p>
           <a:p>
             <a:r>
-              <a:rPr lang="en-US" sz="600" dirty="0">
+              <a:rPr lang="en-US" sz="1400" dirty="0">
                 <a:solidFill>
                   <a:srgbClr val="D9D9D9"/>
                 </a:solidFill>
               </a:rPr>
               <a:t>     RUGOGAMU NOELLA</a:t>
             </a:r>
-            <a:endParaRPr lang="en-UG" sz="600" dirty="0">
+            <a:endParaRPr lang="en-UG" sz="1400" dirty="0">
               <a:solidFill>
                 <a:srgbClr val="D9D9D9"/>
               </a:solidFill>
@@ -6982,7 +6982,7 @@
             <p:ph idx="1"/>
             <p:extLst>
               <p:ext uri="{D42A27DB-BD31-4B8C-83A1-F6EECF244321}">
-                <p14:modId xmlns:p14="http://schemas.microsoft.com/office/powerpoint/2010/main" val="284980089"/>
+                <p14:modId xmlns:p14="http://schemas.microsoft.com/office/powerpoint/2010/main" val="3327992091"/>
               </p:ext>
             </p:extLst>
           </p:nvPr>

</xml_diff>